<commit_message>
Update Presentation1 9.35.06 PM.pptx
</commit_message>
<xml_diff>
--- a/Presentation1 9.35.06 PM.pptx
+++ b/Presentation1 9.35.06 PM.pptx
@@ -212,7 +212,7 @@
           <a:p>
             <a:fld id="{21EE2E32-CECD-0049-9CB2-F014D1AD2BFE}" type="datetimeFigureOut">
               <a:rPr lang="en-US" smtClean="0"/>
-              <a:t>6/12/23</a:t>
+              <a:t>6/13/2023</a:t>
             </a:fld>
             <a:endParaRPr lang="en-US"/>
           </a:p>
@@ -732,7 +732,7 @@
           <a:p>
             <a:fld id="{38DC64C1-6B98-A64E-81AF-A4801DFD952A}" type="datetimeFigureOut">
               <a:rPr lang="en-US" smtClean="0"/>
-              <a:t>6/12/23</a:t>
+              <a:t>6/13/2023</a:t>
             </a:fld>
             <a:endParaRPr lang="en-US"/>
           </a:p>
@@ -1062,7 +1062,7 @@
           <a:p>
             <a:fld id="{38DC64C1-6B98-A64E-81AF-A4801DFD952A}" type="datetimeFigureOut">
               <a:rPr lang="en-US" smtClean="0"/>
-              <a:t>6/12/23</a:t>
+              <a:t>6/13/2023</a:t>
             </a:fld>
             <a:endParaRPr lang="en-US"/>
           </a:p>
@@ -1242,7 +1242,7 @@
           <a:p>
             <a:fld id="{38DC64C1-6B98-A64E-81AF-A4801DFD952A}" type="datetimeFigureOut">
               <a:rPr lang="en-US" smtClean="0"/>
-              <a:t>6/12/23</a:t>
+              <a:t>6/13/2023</a:t>
             </a:fld>
             <a:endParaRPr lang="en-US"/>
           </a:p>
@@ -1412,7 +1412,7 @@
           <a:p>
             <a:fld id="{38DC64C1-6B98-A64E-81AF-A4801DFD952A}" type="datetimeFigureOut">
               <a:rPr lang="en-US" smtClean="0"/>
-              <a:t>6/12/23</a:t>
+              <a:t>6/13/2023</a:t>
             </a:fld>
             <a:endParaRPr lang="en-US"/>
           </a:p>
@@ -1689,7 +1689,7 @@
           <a:p>
             <a:fld id="{38DC64C1-6B98-A64E-81AF-A4801DFD952A}" type="datetimeFigureOut">
               <a:rPr lang="en-US" smtClean="0"/>
-              <a:t>6/12/23</a:t>
+              <a:t>6/13/2023</a:t>
             </a:fld>
             <a:endParaRPr lang="en-US"/>
           </a:p>
@@ -2083,7 +2083,7 @@
           <a:p>
             <a:fld id="{38DC64C1-6B98-A64E-81AF-A4801DFD952A}" type="datetimeFigureOut">
               <a:rPr lang="en-US" smtClean="0"/>
-              <a:t>6/12/23</a:t>
+              <a:t>6/13/2023</a:t>
             </a:fld>
             <a:endParaRPr lang="en-US"/>
           </a:p>
@@ -2560,7 +2560,7 @@
           <a:p>
             <a:fld id="{38DC64C1-6B98-A64E-81AF-A4801DFD952A}" type="datetimeFigureOut">
               <a:rPr lang="en-US" smtClean="0"/>
-              <a:t>6/12/23</a:t>
+              <a:t>6/13/2023</a:t>
             </a:fld>
             <a:endParaRPr lang="en-US"/>
           </a:p>
@@ -2678,7 +2678,7 @@
           <a:p>
             <a:fld id="{38DC64C1-6B98-A64E-81AF-A4801DFD952A}" type="datetimeFigureOut">
               <a:rPr lang="en-US" smtClean="0"/>
-              <a:t>6/12/23</a:t>
+              <a:t>6/13/2023</a:t>
             </a:fld>
             <a:endParaRPr lang="en-US"/>
           </a:p>
@@ -2773,7 +2773,7 @@
           <a:p>
             <a:fld id="{38DC64C1-6B98-A64E-81AF-A4801DFD952A}" type="datetimeFigureOut">
               <a:rPr lang="en-US" smtClean="0"/>
-              <a:t>6/12/23</a:t>
+              <a:t>6/13/2023</a:t>
             </a:fld>
             <a:endParaRPr lang="en-US"/>
           </a:p>
@@ -3119,7 +3119,7 @@
           <a:p>
             <a:fld id="{38DC64C1-6B98-A64E-81AF-A4801DFD952A}" type="datetimeFigureOut">
               <a:rPr lang="en-US" smtClean="0"/>
-              <a:t>6/12/23</a:t>
+              <a:t>6/13/2023</a:t>
             </a:fld>
             <a:endParaRPr lang="en-US"/>
           </a:p>
@@ -3507,7 +3507,7 @@
           <a:p>
             <a:fld id="{38DC64C1-6B98-A64E-81AF-A4801DFD952A}" type="datetimeFigureOut">
               <a:rPr lang="en-US" smtClean="0"/>
-              <a:t>6/12/23</a:t>
+              <a:t>6/13/2023</a:t>
             </a:fld>
             <a:endParaRPr lang="en-US"/>
           </a:p>
@@ -3785,7 +3785,7 @@
           <a:p>
             <a:fld id="{38DC64C1-6B98-A64E-81AF-A4801DFD952A}" type="datetimeFigureOut">
               <a:rPr lang="en-US" smtClean="0"/>
-              <a:t>6/12/23</a:t>
+              <a:t>6/13/2023</a:t>
             </a:fld>
             <a:endParaRPr lang="en-US"/>
           </a:p>
@@ -4322,6 +4322,11 @@
               <a:rPr lang="en-US" dirty="0"/>
               <a:t>Web-service</a:t>
             </a:r>
+            <a:r>
+              <a:rPr lang="en-US" altLang="zh-CN" dirty="0"/>
+              <a:t>s</a:t>
+            </a:r>
+            <a:endParaRPr lang="en-US" dirty="0"/>
           </a:p>
         </p:txBody>
       </p:sp>
@@ -5206,6 +5211,66 @@
           </a:p>
         </p:txBody>
       </p:sp>
+      <p:pic>
+        <p:nvPicPr>
+          <p:cNvPr id="3" name="Picture 2">
+            <a:extLst>
+              <a:ext uri="{FF2B5EF4-FFF2-40B4-BE49-F238E27FC236}">
+                <a16:creationId xmlns:a16="http://schemas.microsoft.com/office/drawing/2014/main" id="{F8A43322-83D4-4274-988B-593830CFD361}"/>
+              </a:ext>
+            </a:extLst>
+          </p:cNvPr>
+          <p:cNvPicPr>
+            <a:picLocks noChangeAspect="1"/>
+          </p:cNvPicPr>
+          <p:nvPr/>
+        </p:nvPicPr>
+        <p:blipFill>
+          <a:blip r:embed="rId2"/>
+          <a:stretch>
+            <a:fillRect/>
+          </a:stretch>
+        </p:blipFill>
+        <p:spPr>
+          <a:xfrm>
+            <a:off x="6095999" y="4556983"/>
+            <a:ext cx="5776336" cy="1835270"/>
+          </a:xfrm>
+          <a:prstGeom prst="rect">
+            <a:avLst/>
+          </a:prstGeom>
+        </p:spPr>
+      </p:pic>
+      <p:pic>
+        <p:nvPicPr>
+          <p:cNvPr id="4" name="Picture 3">
+            <a:extLst>
+              <a:ext uri="{FF2B5EF4-FFF2-40B4-BE49-F238E27FC236}">
+                <a16:creationId xmlns:a16="http://schemas.microsoft.com/office/drawing/2014/main" id="{4633606C-D85C-4973-9E31-4555FA42C183}"/>
+              </a:ext>
+            </a:extLst>
+          </p:cNvPr>
+          <p:cNvPicPr>
+            <a:picLocks noChangeAspect="1"/>
+          </p:cNvPicPr>
+          <p:nvPr/>
+        </p:nvPicPr>
+        <p:blipFill>
+          <a:blip r:embed="rId3"/>
+          <a:stretch>
+            <a:fillRect/>
+          </a:stretch>
+        </p:blipFill>
+        <p:spPr>
+          <a:xfrm>
+            <a:off x="1135117" y="4556983"/>
+            <a:ext cx="4670215" cy="1849322"/>
+          </a:xfrm>
+          <a:prstGeom prst="rect">
+            <a:avLst/>
+          </a:prstGeom>
+        </p:spPr>
+      </p:pic>
     </p:spTree>
     <p:extLst>
       <p:ext uri="{BB962C8B-B14F-4D97-AF65-F5344CB8AC3E}">
@@ -5860,36 +5925,52 @@
           <a:p>
             <a:pPr algn="ctr"/>
             <a:r>
-              <a:rPr lang="en-US" sz="7200" cap="all" dirty="0">
+              <a:rPr lang="en-US" sz="7200" dirty="0">
                 <a:solidFill>
                   <a:schemeClr val="bg2"/>
                 </a:solidFill>
               </a:rPr>
-              <a:t>The End </a:t>
+              <a:t>T</a:t>
+            </a:r>
+            <a:r>
+              <a:rPr lang="en-US" altLang="zh-CN" sz="7200" dirty="0">
+                <a:solidFill>
+                  <a:schemeClr val="bg2"/>
+                </a:solidFill>
+              </a:rPr>
+              <a:t>he</a:t>
+            </a:r>
+            <a:r>
+              <a:rPr lang="en-US" sz="7200" dirty="0">
+                <a:solidFill>
+                  <a:schemeClr val="bg2"/>
+                </a:solidFill>
+              </a:rPr>
+              <a:t> End </a:t>
             </a:r>
             <a:br>
-              <a:rPr lang="en-US" sz="7200" cap="all" dirty="0">
+              <a:rPr lang="en-US" sz="7200" dirty="0">
                 <a:solidFill>
                   <a:schemeClr val="bg2"/>
                 </a:solidFill>
               </a:rPr>
             </a:br>
             <a:r>
-              <a:rPr lang="en-US" sz="7200" cap="all" dirty="0">
+              <a:rPr lang="en-US" sz="7200" dirty="0">
                 <a:solidFill>
                   <a:schemeClr val="bg2"/>
                 </a:solidFill>
               </a:rPr>
-              <a:t>Thanks </a:t>
+              <a:t>Thank you for your time </a:t>
             </a:r>
             <a:br>
-              <a:rPr lang="en-US" sz="7200" cap="all" dirty="0">
+              <a:rPr lang="en-US" sz="7200" dirty="0">
                 <a:solidFill>
                   <a:schemeClr val="bg2"/>
                 </a:solidFill>
               </a:rPr>
             </a:br>
-            <a:endParaRPr lang="en-US" sz="7200" cap="all" dirty="0">
+            <a:endParaRPr lang="en-US" sz="7200" dirty="0">
               <a:solidFill>
                 <a:schemeClr val="bg2"/>
               </a:solidFill>
@@ -6340,10 +6421,10 @@
       </p:sp>
       <p:pic>
         <p:nvPicPr>
-          <p:cNvPr id="4" name="Picture 3" descr="A screenshot of a hotel&#10;&#10;Description automatically generated with low confidence">
+          <p:cNvPr id="3" name="Picture 2">
             <a:extLst>
               <a:ext uri="{FF2B5EF4-FFF2-40B4-BE49-F238E27FC236}">
-                <a16:creationId xmlns:a16="http://schemas.microsoft.com/office/drawing/2014/main" id="{4BC20C98-F334-6254-1A78-728D9FD27746}"/>
+                <a16:creationId xmlns:a16="http://schemas.microsoft.com/office/drawing/2014/main" id="{43352B64-ADC1-447F-BE7C-C77A68909726}"/>
               </a:ext>
             </a:extLst>
           </p:cNvPr>
@@ -6360,8 +6441,8 @@
         </p:blipFill>
         <p:spPr>
           <a:xfrm>
-            <a:off x="5031467" y="1574543"/>
-            <a:ext cx="6517065" cy="3388873"/>
+            <a:off x="4349824" y="1658532"/>
+            <a:ext cx="7552090" cy="3266616"/>
           </a:xfrm>
           <a:prstGeom prst="rect">
             <a:avLst/>
@@ -6800,6 +6881,17 @@
           </a:p>
           <a:p>
             <a:r>
+              <a:rPr lang="en-US" altLang="zh-CN" dirty="0">
+                <a:latin typeface="Söhne"/>
+              </a:rPr>
+              <a:t>Documents Table</a:t>
+            </a:r>
+            <a:endParaRPr lang="en-CA" dirty="0">
+              <a:latin typeface="Söhne"/>
+            </a:endParaRPr>
+          </a:p>
+          <a:p>
+            <a:r>
               <a:rPr lang="en-CA" dirty="0">
                 <a:latin typeface="Söhne"/>
               </a:rPr>
@@ -6831,8 +6923,38 @@
         </p:blipFill>
         <p:spPr>
           <a:xfrm>
-            <a:off x="5031467" y="1191666"/>
+            <a:off x="4834923" y="536711"/>
             <a:ext cx="6517065" cy="4154627"/>
+          </a:xfrm>
+          <a:prstGeom prst="rect">
+            <a:avLst/>
+          </a:prstGeom>
+        </p:spPr>
+      </p:pic>
+      <p:pic>
+        <p:nvPicPr>
+          <p:cNvPr id="4" name="Picture 3">
+            <a:extLst>
+              <a:ext uri="{FF2B5EF4-FFF2-40B4-BE49-F238E27FC236}">
+                <a16:creationId xmlns:a16="http://schemas.microsoft.com/office/drawing/2014/main" id="{3A1D1615-94A1-2B9E-2CE3-2621D47BCCEA}"/>
+              </a:ext>
+            </a:extLst>
+          </p:cNvPr>
+          <p:cNvPicPr>
+            <a:picLocks noChangeAspect="1"/>
+          </p:cNvPicPr>
+          <p:nvPr/>
+        </p:nvPicPr>
+        <p:blipFill>
+          <a:blip r:embed="rId3"/>
+          <a:stretch>
+            <a:fillRect/>
+          </a:stretch>
+        </p:blipFill>
+        <p:spPr>
+          <a:xfrm>
+            <a:off x="4834922" y="4691338"/>
+            <a:ext cx="6517065" cy="1967370"/>
           </a:xfrm>
           <a:prstGeom prst="rect">
             <a:avLst/>

</xml_diff>